<commit_message>
Update 09.Steady-Flow Devices (cont).pptx
</commit_message>
<xml_diff>
--- a/09.Steady-Flow Devices (cont).pptx
+++ b/09.Steady-Flow Devices (cont).pptx
@@ -4514,8 +4514,8 @@
         </p:nvSpPr>
         <p:spPr>
           <a:xfrm>
-            <a:off x="5618735" y="3810000"/>
-            <a:ext cx="1326004" cy="369332"/>
+            <a:off x="5727740" y="3810000"/>
+            <a:ext cx="1107996" cy="369332"/>
           </a:xfrm>
           <a:prstGeom prst="rect">
             <a:avLst/>
@@ -4665,7 +4665,7 @@
                 </a:solidFill>
                 <a:hlinkClick r:id="rId3"/>
               </a:rPr>
-              <a:t>Example 4</a:t>
+              <a:t>Solution</a:t>
             </a:r>
             <a:endParaRPr lang="en-US" b="1" dirty="0">
               <a:solidFill>
@@ -5519,8 +5519,8 @@
         </p:nvSpPr>
         <p:spPr>
           <a:xfrm>
-            <a:off x="3908998" y="3625334"/>
-            <a:ext cx="1326004" cy="369332"/>
+            <a:off x="4018003" y="3625334"/>
+            <a:ext cx="1107996" cy="369332"/>
           </a:xfrm>
           <a:prstGeom prst="rect">
             <a:avLst/>
@@ -5670,7 +5670,7 @@
                 </a:solidFill>
                 <a:hlinkClick r:id="rId2"/>
               </a:rPr>
-              <a:t>Example 1</a:t>
+              <a:t>Solution</a:t>
             </a:r>
             <a:endParaRPr lang="en-US" b="1" dirty="0">
               <a:solidFill>
@@ -6362,8 +6362,8 @@
         </p:nvSpPr>
         <p:spPr>
           <a:xfrm>
-            <a:off x="5791200" y="4038600"/>
-            <a:ext cx="1326004" cy="369332"/>
+            <a:off x="5900205" y="4038600"/>
+            <a:ext cx="1107996" cy="369332"/>
           </a:xfrm>
           <a:prstGeom prst="rect">
             <a:avLst/>
@@ -6513,7 +6513,7 @@
                 </a:solidFill>
                 <a:hlinkClick r:id="rId3"/>
               </a:rPr>
-              <a:t>Example 2</a:t>
+              <a:t>Solution</a:t>
             </a:r>
             <a:endParaRPr lang="en-US" b="1" dirty="0">
               <a:solidFill>
@@ -6946,8 +6946,8 @@
         </p:nvSpPr>
         <p:spPr>
           <a:xfrm>
-            <a:off x="3908998" y="4191000"/>
-            <a:ext cx="1326004" cy="369332"/>
+            <a:off x="4018003" y="4191000"/>
+            <a:ext cx="1107996" cy="369332"/>
           </a:xfrm>
           <a:prstGeom prst="rect">
             <a:avLst/>
@@ -7097,7 +7097,7 @@
                 </a:solidFill>
                 <a:hlinkClick r:id="rId2"/>
               </a:rPr>
-              <a:t>Example 3</a:t>
+              <a:t>Solution</a:t>
             </a:r>
             <a:endParaRPr lang="en-US" b="1" dirty="0">
               <a:solidFill>

</xml_diff>